<commit_message>
Color edit parts in slides
</commit_message>
<xml_diff>
--- a/VRM/02_Project2/Vizuálna inšpekcia plastových výliskov.pptx
+++ b/VRM/02_Project2/Vizuálna inšpekcia plastových výliskov.pptx
@@ -4494,7 +4494,12 @@
           <a:prstGeom prst="ellipse">
             <a:avLst/>
           </a:prstGeom>
-          <a:noFill/>
+          <a:solidFill>
+            <a:schemeClr val="accent1">
+              <a:lumMod val="40000"/>
+              <a:lumOff val="60000"/>
+            </a:schemeClr>
+          </a:solidFill>
           <a:ln w="19050">
             <a:solidFill>
               <a:schemeClr val="tx1"/>
@@ -4546,7 +4551,12 @@
           <a:prstGeom prst="ellipse">
             <a:avLst/>
           </a:prstGeom>
-          <a:noFill/>
+          <a:solidFill>
+            <a:schemeClr val="accent1">
+              <a:lumMod val="40000"/>
+              <a:lumOff val="60000"/>
+            </a:schemeClr>
+          </a:solidFill>
           <a:ln w="19050">
             <a:solidFill>
               <a:schemeClr val="tx1"/>
@@ -4598,7 +4608,12 @@
           <a:prstGeom prst="ellipse">
             <a:avLst/>
           </a:prstGeom>
-          <a:noFill/>
+          <a:solidFill>
+            <a:schemeClr val="accent6">
+              <a:lumMod val="60000"/>
+              <a:lumOff val="40000"/>
+            </a:schemeClr>
+          </a:solidFill>
           <a:ln w="19050">
             <a:solidFill>
               <a:schemeClr val="tx1"/>
@@ -4650,7 +4665,12 @@
           <a:prstGeom prst="ellipse">
             <a:avLst/>
           </a:prstGeom>
-          <a:noFill/>
+          <a:solidFill>
+            <a:schemeClr val="accent6">
+              <a:lumMod val="60000"/>
+              <a:lumOff val="40000"/>
+            </a:schemeClr>
+          </a:solidFill>
           <a:ln w="19050">
             <a:solidFill>
               <a:schemeClr val="tx1"/>
@@ -4702,7 +4722,9 @@
           <a:prstGeom prst="ellipse">
             <a:avLst/>
           </a:prstGeom>
-          <a:noFill/>
+          <a:solidFill>
+            <a:srgbClr val="FFE89F"/>
+          </a:solidFill>
           <a:ln w="19050">
             <a:solidFill>
               <a:schemeClr val="tx1"/>
@@ -4754,7 +4776,9 @@
           <a:prstGeom prst="ellipse">
             <a:avLst/>
           </a:prstGeom>
-          <a:noFill/>
+          <a:solidFill>
+            <a:srgbClr val="FFE89F"/>
+          </a:solidFill>
           <a:ln w="19050">
             <a:solidFill>
               <a:schemeClr val="tx1"/>
@@ -11377,7 +11401,19 @@
           <a:lstStyle/>
           <a:p>
             <a:r>
-              <a:rPr lang="cs-CZ" sz="1600" b="1" dirty="0"/>
+              <a:rPr lang="cs-CZ" sz="1600" b="1" dirty="0">
+                <a:ln w="0"/>
+                <a:solidFill>
+                  <a:schemeClr val="accent1"/>
+                </a:solidFill>
+                <a:effectLst>
+                  <a:outerShdw blurRad="38100" dist="25400" dir="5400000" algn="ctr" rotWithShape="0">
+                    <a:srgbClr val="6E747A">
+                      <a:alpha val="43000"/>
+                    </a:srgbClr>
+                  </a:outerShdw>
+                </a:effectLst>
+              </a:rPr>
               <a:t>Big Box</a:t>
             </a:r>
           </a:p>
@@ -11412,11 +11448,35 @@
           <a:lstStyle/>
           <a:p>
             <a:r>
-              <a:rPr lang="cs-CZ" sz="1600" b="1" dirty="0" err="1"/>
+              <a:rPr lang="cs-CZ" sz="1600" b="1" dirty="0" err="1">
+                <a:ln w="0"/>
+                <a:solidFill>
+                  <a:srgbClr val="FFC000"/>
+                </a:solidFill>
+                <a:effectLst>
+                  <a:outerShdw blurRad="38100" dist="25400" dir="5400000" algn="ctr" rotWithShape="0">
+                    <a:srgbClr val="6E747A">
+                      <a:alpha val="43000"/>
+                    </a:srgbClr>
+                  </a:outerShdw>
+                </a:effectLst>
+              </a:rPr>
               <a:t>Small</a:t>
             </a:r>
             <a:r>
-              <a:rPr lang="cs-CZ" sz="1600" b="1" dirty="0"/>
+              <a:rPr lang="cs-CZ" sz="1600" b="1" dirty="0">
+                <a:ln w="0"/>
+                <a:solidFill>
+                  <a:srgbClr val="FFC000"/>
+                </a:solidFill>
+                <a:effectLst>
+                  <a:outerShdw blurRad="38100" dist="25400" dir="5400000" algn="ctr" rotWithShape="0">
+                    <a:srgbClr val="6E747A">
+                      <a:alpha val="43000"/>
+                    </a:srgbClr>
+                  </a:outerShdw>
+                </a:effectLst>
+              </a:rPr>
               <a:t> Box</a:t>
             </a:r>
           </a:p>
@@ -11451,7 +11511,21 @@
           <a:lstStyle/>
           <a:p>
             <a:r>
-              <a:rPr lang="cs-CZ" sz="1600" b="1" dirty="0"/>
+              <a:rPr lang="cs-CZ" sz="1600" b="1" dirty="0">
+                <a:ln w="0"/>
+                <a:solidFill>
+                  <a:schemeClr val="accent6">
+                    <a:lumMod val="50000"/>
+                  </a:schemeClr>
+                </a:solidFill>
+                <a:effectLst>
+                  <a:outerShdw blurRad="38100" dist="25400" dir="5400000" algn="ctr" rotWithShape="0">
+                    <a:srgbClr val="6E747A">
+                      <a:alpha val="43000"/>
+                    </a:srgbClr>
+                  </a:outerShdw>
+                </a:effectLst>
+              </a:rPr>
               <a:t>Medium Box</a:t>
             </a:r>
           </a:p>

</xml_diff>